<commit_message>
Sri | Updated abstract, ppt
</commit_message>
<xml_diff>
--- a/Paxos based directory updates for geo-replicated cloud storage.pptx
+++ b/Paxos based directory updates for geo-replicated cloud storage.pptx
@@ -4525,6 +4525,13 @@
   <p:clrMapOvr>
     <a:masterClrMapping/>
   </p:clrMapOvr>
+  <p:timing>
+    <p:tnLst>
+      <p:par>
+        <p:cTn id="1" dur="indefinite" restart="never" nodeType="tmRoot"/>
+      </p:par>
+    </p:tnLst>
+  </p:timing>
 </p:sld>
 </file>
 
@@ -5285,6 +5292,70 @@
           <a:chExt cx="0" cy="0"/>
         </a:xfrm>
       </p:grpSpPr>
+      <p:pic>
+        <p:nvPicPr>
+          <p:cNvPr id="2050" name="Picture 2" descr="C:\Users\Sripras\AppData\Local\Microsoft\Windows\Temporary Internet Files\Content.IE5\S5NU6IIH\MP900431316[1].jpg"/>
+          <p:cNvPicPr>
+            <a:picLocks noChangeAspect="1" noChangeArrowheads="1"/>
+          </p:cNvPicPr>
+          <p:nvPr/>
+        </p:nvPicPr>
+        <p:blipFill>
+          <a:blip r:embed="rId2" cstate="print">
+            <a:extLst>
+              <a:ext uri="{28A0092B-C50C-407E-A947-70E740481C1C}">
+                <a14:useLocalDpi xmlns:a14="http://schemas.microsoft.com/office/drawing/2010/main" val="0"/>
+              </a:ext>
+            </a:extLst>
+          </a:blip>
+          <a:srcRect/>
+          <a:stretch>
+            <a:fillRect/>
+          </a:stretch>
+        </p:blipFill>
+        <p:spPr bwMode="auto">
+          <a:xfrm>
+            <a:off x="7530117" y="3792270"/>
+            <a:ext cx="1174284" cy="1174284"/>
+          </a:xfrm>
+          <a:prstGeom prst="ellipse">
+            <a:avLst/>
+          </a:prstGeom>
+          <a:ln w="63500" cap="rnd">
+            <a:solidFill>
+              <a:srgbClr val="333333"/>
+            </a:solidFill>
+          </a:ln>
+          <a:effectLst>
+            <a:outerShdw blurRad="381000" dist="292100" dir="5400000" sx="-80000" sy="-18000" rotWithShape="0">
+              <a:srgbClr val="000000">
+                <a:alpha val="22000"/>
+              </a:srgbClr>
+            </a:outerShdw>
+          </a:effectLst>
+          <a:scene3d>
+            <a:camera prst="orthographicFront"/>
+            <a:lightRig rig="contrasting" dir="t">
+              <a:rot lat="0" lon="0" rev="3000000"/>
+            </a:lightRig>
+          </a:scene3d>
+          <a:sp3d contourW="7620">
+            <a:bevelT w="95250" h="31750"/>
+            <a:contourClr>
+              <a:srgbClr val="333333"/>
+            </a:contourClr>
+          </a:sp3d>
+          <a:extLst>
+            <a:ext uri="{909E8E84-426E-40DD-AFC4-6F175D3DCCD1}">
+              <a14:hiddenFill xmlns:a14="http://schemas.microsoft.com/office/drawing/2010/main">
+                <a:solidFill>
+                  <a:srgbClr val="FFFFFF"/>
+                </a:solidFill>
+              </a14:hiddenFill>
+            </a:ext>
+          </a:extLst>
+        </p:spPr>
+      </p:pic>
       <p:sp>
         <p:nvSpPr>
           <p:cNvPr id="27" name="Rectangle 26"/>
@@ -5327,46 +5398,6 @@
       </p:sp>
       <p:sp>
         <p:nvSpPr>
-          <p:cNvPr id="15" name="Oval 14"/>
-          <p:cNvSpPr/>
-          <p:nvPr/>
-        </p:nvSpPr>
-        <p:spPr>
-          <a:xfrm>
-            <a:off x="7530117" y="3736900"/>
-            <a:ext cx="1195515" cy="1190269"/>
-          </a:xfrm>
-          <a:prstGeom prst="ellipse">
-            <a:avLst/>
-          </a:prstGeom>
-        </p:spPr>
-        <p:style>
-          <a:lnRef idx="2">
-            <a:schemeClr val="accent1">
-              <a:shade val="50000"/>
-            </a:schemeClr>
-          </a:lnRef>
-          <a:fillRef idx="1">
-            <a:schemeClr val="accent1"/>
-          </a:fillRef>
-          <a:effectRef idx="0">
-            <a:schemeClr val="accent1"/>
-          </a:effectRef>
-          <a:fontRef idx="minor">
-            <a:schemeClr val="lt1"/>
-          </a:fontRef>
-        </p:style>
-        <p:txBody>
-          <a:bodyPr rtlCol="0" anchor="ctr"/>
-          <a:lstStyle/>
-          <a:p>
-            <a:pPr algn="ctr"/>
-            <a:endParaRPr lang="en-US"/>
-          </a:p>
-        </p:txBody>
-      </p:sp>
-      <p:sp>
-        <p:nvSpPr>
           <p:cNvPr id="2" name="Title 1"/>
           <p:cNvSpPr>
             <a:spLocks noGrp="1"/>
@@ -5420,7 +5451,6 @@
               <a:rPr lang="en-US" sz="1800" dirty="0" smtClean="0"/>
               <a:t>Access patterns for objects in social networks change and data must move to optimize access latencies.</a:t>
             </a:r>
-            <a:endParaRPr lang="en-US" sz="1800" dirty="0" smtClean="0"/>
           </a:p>
           <a:p>
             <a:r>
@@ -5512,7 +5542,7 @@
           <p:nvPr/>
         </p:nvPicPr>
         <p:blipFill>
-          <a:blip r:embed="rId2">
+          <a:blip r:embed="rId3">
             <a:extLst>
               <a:ext uri="{28A0092B-C50C-407E-A947-70E740481C1C}">
                 <a14:useLocalDpi xmlns:a14="http://schemas.microsoft.com/office/drawing/2010/main" val="0"/>
@@ -5552,7 +5582,7 @@
         </p:nvSpPr>
         <p:spPr>
           <a:xfrm>
-            <a:off x="3347099" y="2898075"/>
+            <a:off x="3430854" y="2835802"/>
             <a:ext cx="2971800" cy="369332"/>
           </a:xfrm>
           <a:prstGeom prst="rect">
@@ -5568,7 +5598,7 @@
           <a:p>
             <a:r>
               <a:rPr lang="en-US" dirty="0" smtClean="0"/>
-              <a:t>Data re-configuration engine</a:t>
+              <a:t>Replica placement engine</a:t>
             </a:r>
             <a:endParaRPr lang="en-US" dirty="0"/>
           </a:p>
@@ -5583,7 +5613,7 @@
           <p:nvPr/>
         </p:nvPicPr>
         <p:blipFill>
-          <a:blip r:embed="rId3" cstate="print">
+          <a:blip r:embed="rId4" cstate="print">
             <a:extLst>
               <a:ext uri="{28A0092B-C50C-407E-A947-70E740481C1C}">
                 <a14:useLocalDpi xmlns:a14="http://schemas.microsoft.com/office/drawing/2010/main" val="0"/>
@@ -5624,7 +5654,7 @@
           <p:nvPr/>
         </p:nvPicPr>
         <p:blipFill>
-          <a:blip r:embed="rId3" cstate="print">
+          <a:blip r:embed="rId4" cstate="print">
             <a:extLst>
               <a:ext uri="{28A0092B-C50C-407E-A947-70E740481C1C}">
                 <a14:useLocalDpi xmlns:a14="http://schemas.microsoft.com/office/drawing/2010/main" val="0"/>
@@ -5665,7 +5695,7 @@
           <p:nvPr/>
         </p:nvPicPr>
         <p:blipFill>
-          <a:blip r:embed="rId3" cstate="print">
+          <a:blip r:embed="rId4" cstate="print">
             <a:extLst>
               <a:ext uri="{28A0092B-C50C-407E-A947-70E740481C1C}">
                 <a14:useLocalDpi xmlns:a14="http://schemas.microsoft.com/office/drawing/2010/main" val="0"/>
@@ -5679,7 +5709,7 @@
         </p:blipFill>
         <p:spPr bwMode="auto">
           <a:xfrm>
-            <a:off x="7946823" y="4603573"/>
+            <a:off x="7936208" y="4682590"/>
             <a:ext cx="362102" cy="447750"/>
           </a:xfrm>
           <a:prstGeom prst="rect">
@@ -6395,7 +6425,7 @@
         </p:nvSpPr>
         <p:spPr>
           <a:xfrm>
-            <a:off x="7017247" y="5051323"/>
+            <a:off x="7017247" y="5115394"/>
             <a:ext cx="2221254" cy="646331"/>
           </a:xfrm>
           <a:prstGeom prst="rect">
@@ -6411,7 +6441,11 @@
           <a:p>
             <a:r>
               <a:rPr lang="en-US" dirty="0" smtClean="0"/>
-              <a:t>Distributed, replicated data-store</a:t>
+              <a:t>Geo-distributed</a:t>
+            </a:r>
+            <a:r>
+              <a:rPr lang="en-US" dirty="0" smtClean="0"/>
+              <a:t>, replicated data-store</a:t>
             </a:r>
             <a:endParaRPr lang="en-US" dirty="0"/>
           </a:p>
@@ -6451,7 +6485,6 @@
         <p:nvCxnSpPr>
           <p:cNvPr id="32" name="Straight Arrow Connector 31"/>
           <p:cNvCxnSpPr>
-            <a:stCxn id="15" idx="2"/>
             <a:endCxn id="1026" idx="3"/>
           </p:cNvCxnSpPr>
           <p:nvPr/>
@@ -6846,6 +6879,13 @@
   <p:clrMapOvr>
     <a:masterClrMapping/>
   </p:clrMapOvr>
+  <p:timing>
+    <p:tnLst>
+      <p:par>
+        <p:cTn id="1" dur="indefinite" restart="never" nodeType="tmRoot"/>
+      </p:par>
+    </p:tnLst>
+  </p:timing>
 </p:sld>
 </file>
 
@@ -7219,8 +7259,10 @@
       </p:sp>
       <p:pic>
         <p:nvPicPr>
-          <p:cNvPr id="4" name="Picture 3" descr="C:\Users\Sripras\Desktop\inconsistent update.jpg"/>
-          <p:cNvPicPr/>
+          <p:cNvPr id="1026" name="Picture 2" descr="C:\Users\Sripras\AppData\Local\Microsoft\Windows\Temporary Internet Files\Content.IE5\A6V9TX1G\MC900433867[1].png"/>
+          <p:cNvPicPr>
+            <a:picLocks noChangeAspect="1" noChangeArrowheads="1"/>
+          </p:cNvPicPr>
           <p:nvPr/>
         </p:nvPicPr>
         <p:blipFill>
@@ -7238,18 +7280,1064 @@
         </p:blipFill>
         <p:spPr bwMode="auto">
           <a:xfrm>
-            <a:off x="2963334" y="2949222"/>
-            <a:ext cx="5334000" cy="3937000"/>
+            <a:off x="533400" y="4878624"/>
+            <a:ext cx="914286" cy="914286"/>
           </a:xfrm>
           <a:prstGeom prst="rect">
             <a:avLst/>
           </a:prstGeom>
           <a:noFill/>
+          <a:extLst>
+            <a:ext uri="{909E8E84-426E-40DD-AFC4-6F175D3DCCD1}">
+              <a14:hiddenFill xmlns:a14="http://schemas.microsoft.com/office/drawing/2010/main">
+                <a:solidFill>
+                  <a:srgbClr val="FFFFFF"/>
+                </a:solidFill>
+              </a14:hiddenFill>
+            </a:ext>
+          </a:extLst>
+        </p:spPr>
+      </p:pic>
+      <p:pic>
+        <p:nvPicPr>
+          <p:cNvPr id="1027" name="Picture 3" descr="C:\Users\Sripras\AppData\Local\Microsoft\Windows\Temporary Internet Files\Content.IE5\24UHWFW8\MC900030293[2].wmf"/>
+          <p:cNvPicPr>
+            <a:picLocks noChangeAspect="1" noChangeArrowheads="1"/>
+          </p:cNvPicPr>
+          <p:nvPr/>
+        </p:nvPicPr>
+        <p:blipFill>
+          <a:blip r:embed="rId3" cstate="print">
+            <a:extLst>
+              <a:ext uri="{28A0092B-C50C-407E-A947-70E740481C1C}">
+                <a14:useLocalDpi xmlns:a14="http://schemas.microsoft.com/office/drawing/2010/main" val="0"/>
+              </a:ext>
+            </a:extLst>
+          </a:blip>
+          <a:srcRect/>
+          <a:stretch>
+            <a:fillRect/>
+          </a:stretch>
+        </p:blipFill>
+        <p:spPr bwMode="auto">
+          <a:xfrm>
+            <a:off x="3795130" y="4767805"/>
+            <a:ext cx="913029" cy="699516"/>
+          </a:xfrm>
+          <a:prstGeom prst="rect">
+            <a:avLst/>
+          </a:prstGeom>
+          <a:noFill/>
+          <a:extLst>
+            <a:ext uri="{909E8E84-426E-40DD-AFC4-6F175D3DCCD1}">
+              <a14:hiddenFill xmlns:a14="http://schemas.microsoft.com/office/drawing/2010/main">
+                <a:solidFill>
+                  <a:srgbClr val="FFFFFF"/>
+                </a:solidFill>
+              </a14:hiddenFill>
+            </a:ext>
+          </a:extLst>
+        </p:spPr>
+      </p:pic>
+      <p:pic>
+        <p:nvPicPr>
+          <p:cNvPr id="8" name="Picture 3" descr="C:\Users\Sripras\AppData\Local\Microsoft\Windows\Temporary Internet Files\Content.IE5\24UHWFW8\MC900030293[2].wmf"/>
+          <p:cNvPicPr>
+            <a:picLocks noChangeAspect="1" noChangeArrowheads="1"/>
+          </p:cNvPicPr>
+          <p:nvPr/>
+        </p:nvPicPr>
+        <p:blipFill>
+          <a:blip r:embed="rId3" cstate="print">
+            <a:extLst>
+              <a:ext uri="{28A0092B-C50C-407E-A947-70E740481C1C}">
+                <a14:useLocalDpi xmlns:a14="http://schemas.microsoft.com/office/drawing/2010/main" val="0"/>
+              </a:ext>
+            </a:extLst>
+          </a:blip>
+          <a:srcRect/>
+          <a:stretch>
+            <a:fillRect/>
+          </a:stretch>
+        </p:blipFill>
+        <p:spPr bwMode="auto">
+          <a:xfrm>
+            <a:off x="6526085" y="5875951"/>
+            <a:ext cx="913029" cy="699516"/>
+          </a:xfrm>
+          <a:prstGeom prst="rect">
+            <a:avLst/>
+          </a:prstGeom>
+          <a:noFill/>
+          <a:extLst>
+            <a:ext uri="{909E8E84-426E-40DD-AFC4-6F175D3DCCD1}">
+              <a14:hiddenFill xmlns:a14="http://schemas.microsoft.com/office/drawing/2010/main">
+                <a:solidFill>
+                  <a:srgbClr val="FFFFFF"/>
+                </a:solidFill>
+              </a14:hiddenFill>
+            </a:ext>
+          </a:extLst>
+        </p:spPr>
+      </p:pic>
+      <p:pic>
+        <p:nvPicPr>
+          <p:cNvPr id="1028" name="Picture 4" descr="C:\Users\Sripras\AppData\Local\Microsoft\Windows\Temporary Internet Files\Content.IE5\EJPT9TYZ\MC900434845[1].png"/>
+          <p:cNvPicPr>
+            <a:picLocks noChangeAspect="1" noChangeArrowheads="1"/>
+          </p:cNvPicPr>
+          <p:nvPr/>
+        </p:nvPicPr>
+        <p:blipFill>
+          <a:blip r:embed="rId4">
+            <a:extLst>
+              <a:ext uri="{28A0092B-C50C-407E-A947-70E740481C1C}">
+                <a14:useLocalDpi xmlns:a14="http://schemas.microsoft.com/office/drawing/2010/main" val="0"/>
+              </a:ext>
+            </a:extLst>
+          </a:blip>
+          <a:srcRect/>
+          <a:stretch>
+            <a:fillRect/>
+          </a:stretch>
+        </p:blipFill>
+        <p:spPr bwMode="auto">
+          <a:xfrm>
+            <a:off x="5171280" y="3343856"/>
+            <a:ext cx="857250" cy="857250"/>
+          </a:xfrm>
+          <a:prstGeom prst="rect">
+            <a:avLst/>
+          </a:prstGeom>
+          <a:noFill/>
+          <a:extLst>
+            <a:ext uri="{909E8E84-426E-40DD-AFC4-6F175D3DCCD1}">
+              <a14:hiddenFill xmlns:a14="http://schemas.microsoft.com/office/drawing/2010/main">
+                <a:solidFill>
+                  <a:srgbClr val="FFFFFF"/>
+                </a:solidFill>
+              </a14:hiddenFill>
+            </a:ext>
+          </a:extLst>
+        </p:spPr>
+      </p:pic>
+      <p:pic>
+        <p:nvPicPr>
+          <p:cNvPr id="10" name="Picture 4" descr="C:\Users\Sripras\AppData\Local\Microsoft\Windows\Temporary Internet Files\Content.IE5\EJPT9TYZ\MC900434845[1].png"/>
+          <p:cNvPicPr>
+            <a:picLocks noChangeAspect="1" noChangeArrowheads="1"/>
+          </p:cNvPicPr>
+          <p:nvPr/>
+        </p:nvPicPr>
+        <p:blipFill>
+          <a:blip r:embed="rId4">
+            <a:extLst>
+              <a:ext uri="{28A0092B-C50C-407E-A947-70E740481C1C}">
+                <a14:useLocalDpi xmlns:a14="http://schemas.microsoft.com/office/drawing/2010/main" val="0"/>
+              </a:ext>
+            </a:extLst>
+          </a:blip>
+          <a:srcRect/>
+          <a:stretch>
+            <a:fillRect/>
+          </a:stretch>
+        </p:blipFill>
+        <p:spPr bwMode="auto">
+          <a:xfrm>
+            <a:off x="7143750" y="3944611"/>
+            <a:ext cx="857250" cy="857250"/>
+          </a:xfrm>
+          <a:prstGeom prst="rect">
+            <a:avLst/>
+          </a:prstGeom>
+          <a:noFill/>
+          <a:extLst>
+            <a:ext uri="{909E8E84-426E-40DD-AFC4-6F175D3DCCD1}">
+              <a14:hiddenFill xmlns:a14="http://schemas.microsoft.com/office/drawing/2010/main">
+                <a:solidFill>
+                  <a:srgbClr val="FFFFFF"/>
+                </a:solidFill>
+              </a14:hiddenFill>
+            </a:ext>
+          </a:extLst>
+        </p:spPr>
+      </p:pic>
+      <p:pic>
+        <p:nvPicPr>
+          <p:cNvPr id="1029" name="Picture 5" descr="C:\Users\Sripras\AppData\Local\Microsoft\Windows\Temporary Internet Files\Content.IE5\A6V9TX1G\MC900441763[1].png"/>
+          <p:cNvPicPr>
+            <a:picLocks noChangeAspect="1" noChangeArrowheads="1"/>
+          </p:cNvPicPr>
+          <p:nvPr/>
+        </p:nvPicPr>
+        <p:blipFill>
+          <a:blip r:embed="rId5" cstate="print">
+            <a:extLst>
+              <a:ext uri="{28A0092B-C50C-407E-A947-70E740481C1C}">
+                <a14:useLocalDpi xmlns:a14="http://schemas.microsoft.com/office/drawing/2010/main" val="0"/>
+              </a:ext>
+            </a:extLst>
+          </a:blip>
+          <a:srcRect/>
+          <a:stretch>
+            <a:fillRect/>
+          </a:stretch>
+        </p:blipFill>
+        <p:spPr bwMode="auto">
+          <a:xfrm>
+            <a:off x="3751481" y="4154346"/>
+            <a:ext cx="666750" cy="666750"/>
+          </a:xfrm>
+          <a:prstGeom prst="rect">
+            <a:avLst/>
+          </a:prstGeom>
+          <a:noFill/>
+          <a:extLst>
+            <a:ext uri="{909E8E84-426E-40DD-AFC4-6F175D3DCCD1}">
+              <a14:hiddenFill xmlns:a14="http://schemas.microsoft.com/office/drawing/2010/main">
+                <a:solidFill>
+                  <a:srgbClr val="FFFFFF"/>
+                </a:solidFill>
+              </a14:hiddenFill>
+            </a:ext>
+          </a:extLst>
+        </p:spPr>
+      </p:pic>
+      <p:pic>
+        <p:nvPicPr>
+          <p:cNvPr id="12" name="Picture 5" descr="C:\Users\Sripras\AppData\Local\Microsoft\Windows\Temporary Internet Files\Content.IE5\A6V9TX1G\MC900441763[1].png"/>
+          <p:cNvPicPr>
+            <a:picLocks noChangeAspect="1" noChangeArrowheads="1"/>
+          </p:cNvPicPr>
+          <p:nvPr/>
+        </p:nvPicPr>
+        <p:blipFill>
+          <a:blip r:embed="rId5" cstate="print">
+            <a:extLst>
+              <a:ext uri="{28A0092B-C50C-407E-A947-70E740481C1C}">
+                <a14:useLocalDpi xmlns:a14="http://schemas.microsoft.com/office/drawing/2010/main" val="0"/>
+              </a:ext>
+            </a:extLst>
+          </a:blip>
+          <a:srcRect/>
+          <a:stretch>
+            <a:fillRect/>
+          </a:stretch>
+        </p:blipFill>
+        <p:spPr bwMode="auto">
+          <a:xfrm>
+            <a:off x="6477000" y="5256311"/>
+            <a:ext cx="666750" cy="666750"/>
+          </a:xfrm>
+          <a:prstGeom prst="rect">
+            <a:avLst/>
+          </a:prstGeom>
+          <a:noFill/>
+          <a:extLst>
+            <a:ext uri="{909E8E84-426E-40DD-AFC4-6F175D3DCCD1}">
+              <a14:hiddenFill xmlns:a14="http://schemas.microsoft.com/office/drawing/2010/main">
+                <a:solidFill>
+                  <a:srgbClr val="FFFFFF"/>
+                </a:solidFill>
+              </a14:hiddenFill>
+            </a:ext>
+          </a:extLst>
+        </p:spPr>
+      </p:pic>
+      <p:pic>
+        <p:nvPicPr>
+          <p:cNvPr id="1030" name="Picture 6" descr="C:\Users\Sripras\AppData\Local\Microsoft\Windows\Temporary Internet Files\Content.IE5\A6V9TX1G\MP900390095[1].jpg"/>
+          <p:cNvPicPr>
+            <a:picLocks noChangeAspect="1" noChangeArrowheads="1"/>
+          </p:cNvPicPr>
+          <p:nvPr/>
+        </p:nvPicPr>
+        <p:blipFill>
+          <a:blip r:embed="rId6" cstate="print">
+            <a:extLst>
+              <a:ext uri="{28A0092B-C50C-407E-A947-70E740481C1C}">
+                <a14:useLocalDpi xmlns:a14="http://schemas.microsoft.com/office/drawing/2010/main" val="0"/>
+              </a:ext>
+            </a:extLst>
+          </a:blip>
+          <a:srcRect/>
+          <a:stretch>
+            <a:fillRect/>
+          </a:stretch>
+        </p:blipFill>
+        <p:spPr bwMode="auto">
+          <a:xfrm>
+            <a:off x="6848386" y="3523225"/>
+            <a:ext cx="590728" cy="421386"/>
+          </a:xfrm>
+          <a:prstGeom prst="rect">
+            <a:avLst/>
+          </a:prstGeom>
+          <a:noFill/>
+          <a:extLst>
+            <a:ext uri="{909E8E84-426E-40DD-AFC4-6F175D3DCCD1}">
+              <a14:hiddenFill xmlns:a14="http://schemas.microsoft.com/office/drawing/2010/main">
+                <a:solidFill>
+                  <a:srgbClr val="FFFFFF"/>
+                </a:solidFill>
+              </a14:hiddenFill>
+            </a:ext>
+          </a:extLst>
+        </p:spPr>
+      </p:pic>
+      <p:cxnSp>
+        <p:nvCxnSpPr>
+          <p:cNvPr id="6" name="Straight Arrow Connector 5"/>
+          <p:cNvCxnSpPr>
+            <a:stCxn id="10" idx="1"/>
+            <a:endCxn id="1028" idx="3"/>
+          </p:cNvCxnSpPr>
+          <p:nvPr/>
+        </p:nvCxnSpPr>
+        <p:spPr>
+          <a:xfrm flipH="1" flipV="1">
+            <a:off x="6028530" y="3772481"/>
+            <a:ext cx="1115220" cy="600755"/>
+          </a:xfrm>
+          <a:prstGeom prst="straightConnector1">
+            <a:avLst/>
+          </a:prstGeom>
           <a:ln>
-            <a:noFill/>
+            <a:tailEnd type="arrow"/>
           </a:ln>
         </p:spPr>
+        <p:style>
+          <a:lnRef idx="1">
+            <a:schemeClr val="accent1"/>
+          </a:lnRef>
+          <a:fillRef idx="0">
+            <a:schemeClr val="accent1"/>
+          </a:fillRef>
+          <a:effectRef idx="0">
+            <a:schemeClr val="accent1"/>
+          </a:effectRef>
+          <a:fontRef idx="minor">
+            <a:schemeClr val="tx1"/>
+          </a:fontRef>
+        </p:style>
+      </p:cxnSp>
+      <p:cxnSp>
+        <p:nvCxnSpPr>
+          <p:cNvPr id="16" name="Straight Arrow Connector 15"/>
+          <p:cNvCxnSpPr>
+            <a:endCxn id="8" idx="0"/>
+          </p:cNvCxnSpPr>
+          <p:nvPr/>
+        </p:nvCxnSpPr>
+        <p:spPr>
+          <a:xfrm>
+            <a:off x="6586140" y="4072858"/>
+            <a:ext cx="396460" cy="1803093"/>
+          </a:xfrm>
+          <a:prstGeom prst="straightConnector1">
+            <a:avLst/>
+          </a:prstGeom>
+          <a:ln>
+            <a:tailEnd type="arrow"/>
+          </a:ln>
+        </p:spPr>
+        <p:style>
+          <a:lnRef idx="1">
+            <a:schemeClr val="accent1"/>
+          </a:lnRef>
+          <a:fillRef idx="0">
+            <a:schemeClr val="accent1"/>
+          </a:fillRef>
+          <a:effectRef idx="0">
+            <a:schemeClr val="accent1"/>
+          </a:effectRef>
+          <a:fontRef idx="minor">
+            <a:schemeClr val="tx1"/>
+          </a:fontRef>
+        </p:style>
+      </p:cxnSp>
+      <p:cxnSp>
+        <p:nvCxnSpPr>
+          <p:cNvPr id="19" name="Straight Arrow Connector 18"/>
+          <p:cNvCxnSpPr/>
+          <p:nvPr/>
+        </p:nvCxnSpPr>
+        <p:spPr>
+          <a:xfrm flipH="1">
+            <a:off x="4953000" y="4072858"/>
+            <a:ext cx="1633142" cy="694947"/>
+          </a:xfrm>
+          <a:prstGeom prst="straightConnector1">
+            <a:avLst/>
+          </a:prstGeom>
+          <a:ln>
+            <a:prstDash val="dash"/>
+            <a:tailEnd type="arrow"/>
+          </a:ln>
+        </p:spPr>
+        <p:style>
+          <a:lnRef idx="1">
+            <a:schemeClr val="accent1"/>
+          </a:lnRef>
+          <a:fillRef idx="0">
+            <a:schemeClr val="accent1"/>
+          </a:fillRef>
+          <a:effectRef idx="0">
+            <a:schemeClr val="accent1"/>
+          </a:effectRef>
+          <a:fontRef idx="minor">
+            <a:schemeClr val="tx1"/>
+          </a:fontRef>
+        </p:style>
+      </p:cxnSp>
+      <p:cxnSp>
+        <p:nvCxnSpPr>
+          <p:cNvPr id="20" name="Straight Arrow Connector 19"/>
+          <p:cNvCxnSpPr>
+            <a:stCxn id="1027" idx="3"/>
+            <a:endCxn id="8" idx="1"/>
+          </p:cNvCxnSpPr>
+          <p:nvPr/>
+        </p:nvCxnSpPr>
+        <p:spPr>
+          <a:xfrm>
+            <a:off x="4708159" y="5117563"/>
+            <a:ext cx="1817926" cy="1108146"/>
+          </a:xfrm>
+          <a:prstGeom prst="straightConnector1">
+            <a:avLst/>
+          </a:prstGeom>
+          <a:ln>
+            <a:prstDash val="dash"/>
+            <a:headEnd type="arrow"/>
+            <a:tailEnd type="arrow"/>
+          </a:ln>
+        </p:spPr>
+        <p:style>
+          <a:lnRef idx="1">
+            <a:schemeClr val="accent1"/>
+          </a:lnRef>
+          <a:fillRef idx="0">
+            <a:schemeClr val="accent1"/>
+          </a:fillRef>
+          <a:effectRef idx="0">
+            <a:schemeClr val="accent1"/>
+          </a:effectRef>
+          <a:fontRef idx="minor">
+            <a:schemeClr val="tx1"/>
+          </a:fontRef>
+        </p:style>
+      </p:cxnSp>
+      <p:cxnSp>
+        <p:nvCxnSpPr>
+          <p:cNvPr id="29" name="Straight Arrow Connector 28"/>
+          <p:cNvCxnSpPr>
+            <a:stCxn id="1026" idx="3"/>
+            <a:endCxn id="1027" idx="1"/>
+          </p:cNvCxnSpPr>
+          <p:nvPr/>
+        </p:nvCxnSpPr>
+        <p:spPr>
+          <a:xfrm flipV="1">
+            <a:off x="1447686" y="5117563"/>
+            <a:ext cx="2347444" cy="218204"/>
+          </a:xfrm>
+          <a:prstGeom prst="straightConnector1">
+            <a:avLst/>
+          </a:prstGeom>
+          <a:ln>
+            <a:tailEnd type="arrow"/>
+          </a:ln>
+        </p:spPr>
+        <p:style>
+          <a:lnRef idx="1">
+            <a:schemeClr val="accent1"/>
+          </a:lnRef>
+          <a:fillRef idx="0">
+            <a:schemeClr val="accent1"/>
+          </a:fillRef>
+          <a:effectRef idx="0">
+            <a:schemeClr val="accent1"/>
+          </a:effectRef>
+          <a:fontRef idx="minor">
+            <a:schemeClr val="tx1"/>
+          </a:fontRef>
+        </p:style>
+      </p:cxnSp>
+      <p:cxnSp>
+        <p:nvCxnSpPr>
+          <p:cNvPr id="34" name="Straight Arrow Connector 33"/>
+          <p:cNvCxnSpPr/>
+          <p:nvPr/>
+        </p:nvCxnSpPr>
+        <p:spPr>
+          <a:xfrm flipH="1">
+            <a:off x="1447686" y="5226665"/>
+            <a:ext cx="2303795" cy="183535"/>
+          </a:xfrm>
+          <a:prstGeom prst="straightConnector1">
+            <a:avLst/>
+          </a:prstGeom>
+          <a:ln>
+            <a:tailEnd type="arrow"/>
+          </a:ln>
+        </p:spPr>
+        <p:style>
+          <a:lnRef idx="1">
+            <a:schemeClr val="accent1"/>
+          </a:lnRef>
+          <a:fillRef idx="0">
+            <a:schemeClr val="accent1"/>
+          </a:fillRef>
+          <a:effectRef idx="0">
+            <a:schemeClr val="accent1"/>
+          </a:effectRef>
+          <a:fontRef idx="minor">
+            <a:schemeClr val="tx1"/>
+          </a:fontRef>
+        </p:style>
+      </p:cxnSp>
+      <p:cxnSp>
+        <p:nvCxnSpPr>
+          <p:cNvPr id="40" name="Straight Arrow Connector 39"/>
+          <p:cNvCxnSpPr>
+            <a:stCxn id="1026" idx="2"/>
+            <a:endCxn id="8" idx="1"/>
+          </p:cNvCxnSpPr>
+          <p:nvPr/>
+        </p:nvCxnSpPr>
+        <p:spPr>
+          <a:xfrm>
+            <a:off x="990543" y="5792910"/>
+            <a:ext cx="5535542" cy="432799"/>
+          </a:xfrm>
+          <a:prstGeom prst="straightConnector1">
+            <a:avLst/>
+          </a:prstGeom>
+          <a:ln>
+            <a:tailEnd type="arrow"/>
+          </a:ln>
+        </p:spPr>
+        <p:style>
+          <a:lnRef idx="1">
+            <a:schemeClr val="accent1"/>
+          </a:lnRef>
+          <a:fillRef idx="0">
+            <a:schemeClr val="accent1"/>
+          </a:fillRef>
+          <a:effectRef idx="0">
+            <a:schemeClr val="accent1"/>
+          </a:effectRef>
+          <a:fontRef idx="minor">
+            <a:schemeClr val="tx1"/>
+          </a:fontRef>
+        </p:style>
+      </p:cxnSp>
+      <p:cxnSp>
+        <p:nvCxnSpPr>
+          <p:cNvPr id="41" name="Straight Arrow Connector 40"/>
+          <p:cNvCxnSpPr/>
+          <p:nvPr/>
+        </p:nvCxnSpPr>
+        <p:spPr>
+          <a:xfrm flipH="1" flipV="1">
+            <a:off x="990543" y="5875951"/>
+            <a:ext cx="5486457" cy="448650"/>
+          </a:xfrm>
+          <a:prstGeom prst="straightConnector1">
+            <a:avLst/>
+          </a:prstGeom>
+          <a:ln>
+            <a:tailEnd type="arrow"/>
+          </a:ln>
+        </p:spPr>
+        <p:style>
+          <a:lnRef idx="1">
+            <a:schemeClr val="accent1"/>
+          </a:lnRef>
+          <a:fillRef idx="0">
+            <a:schemeClr val="accent1"/>
+          </a:fillRef>
+          <a:effectRef idx="0">
+            <a:schemeClr val="accent1"/>
+          </a:effectRef>
+          <a:fontRef idx="minor">
+            <a:schemeClr val="tx1"/>
+          </a:fontRef>
+        </p:style>
+      </p:cxnSp>
+      <p:pic>
+        <p:nvPicPr>
+          <p:cNvPr id="1031" name="Picture 7" descr="C:\Users\Sripras\AppData\Local\Microsoft\Windows\Temporary Internet Files\Content.IE5\24UHWFW8\MC900432537[1].png"/>
+          <p:cNvPicPr>
+            <a:picLocks noChangeAspect="1" noChangeArrowheads="1"/>
+          </p:cNvPicPr>
+          <p:nvPr/>
+        </p:nvPicPr>
+        <p:blipFill>
+          <a:blip r:embed="rId7" cstate="print">
+            <a:extLst>
+              <a:ext uri="{28A0092B-C50C-407E-A947-70E740481C1C}">
+                <a14:useLocalDpi xmlns:a14="http://schemas.microsoft.com/office/drawing/2010/main" val="0"/>
+              </a:ext>
+            </a:extLst>
+          </a:blip>
+          <a:srcRect/>
+          <a:stretch>
+            <a:fillRect/>
+          </a:stretch>
+        </p:blipFill>
+        <p:spPr bwMode="auto">
+          <a:xfrm>
+            <a:off x="5171280" y="4537381"/>
+            <a:ext cx="230424" cy="230424"/>
+          </a:xfrm>
+          <a:prstGeom prst="rect">
+            <a:avLst/>
+          </a:prstGeom>
+          <a:noFill/>
+          <a:extLst>
+            <a:ext uri="{909E8E84-426E-40DD-AFC4-6F175D3DCCD1}">
+              <a14:hiddenFill xmlns:a14="http://schemas.microsoft.com/office/drawing/2010/main">
+                <a:solidFill>
+                  <a:srgbClr val="FFFFFF"/>
+                </a:solidFill>
+              </a14:hiddenFill>
+            </a:ext>
+          </a:extLst>
+        </p:spPr>
       </p:pic>
+      <p:pic>
+        <p:nvPicPr>
+          <p:cNvPr id="64" name="Picture 7" descr="C:\Users\Sripras\AppData\Local\Microsoft\Windows\Temporary Internet Files\Content.IE5\24UHWFW8\MC900432537[1].png"/>
+          <p:cNvPicPr>
+            <a:picLocks noChangeAspect="1" noChangeArrowheads="1"/>
+          </p:cNvPicPr>
+          <p:nvPr/>
+        </p:nvPicPr>
+        <p:blipFill>
+          <a:blip r:embed="rId7" cstate="print">
+            <a:extLst>
+              <a:ext uri="{28A0092B-C50C-407E-A947-70E740481C1C}">
+                <a14:useLocalDpi xmlns:a14="http://schemas.microsoft.com/office/drawing/2010/main" val="0"/>
+              </a:ext>
+            </a:extLst>
+          </a:blip>
+          <a:srcRect/>
+          <a:stretch>
+            <a:fillRect/>
+          </a:stretch>
+        </p:blipFill>
+        <p:spPr bwMode="auto">
+          <a:xfrm>
+            <a:off x="5495758" y="5552463"/>
+            <a:ext cx="230424" cy="230424"/>
+          </a:xfrm>
+          <a:prstGeom prst="rect">
+            <a:avLst/>
+          </a:prstGeom>
+          <a:noFill/>
+          <a:extLst>
+            <a:ext uri="{909E8E84-426E-40DD-AFC4-6F175D3DCCD1}">
+              <a14:hiddenFill xmlns:a14="http://schemas.microsoft.com/office/drawing/2010/main">
+                <a:solidFill>
+                  <a:srgbClr val="FFFFFF"/>
+                </a:solidFill>
+              </a14:hiddenFill>
+            </a:ext>
+          </a:extLst>
+        </p:spPr>
+      </p:pic>
+      <p:sp>
+        <p:nvSpPr>
+          <p:cNvPr id="58" name="TextBox 57"/>
+          <p:cNvSpPr txBox="1"/>
+          <p:nvPr/>
+        </p:nvSpPr>
+        <p:spPr>
+          <a:xfrm>
+            <a:off x="6705600" y="3215448"/>
+            <a:ext cx="1114425" cy="307777"/>
+          </a:xfrm>
+          <a:prstGeom prst="rect">
+            <a:avLst/>
+          </a:prstGeom>
+          <a:noFill/>
+        </p:spPr>
+        <p:txBody>
+          <a:bodyPr wrap="square" rtlCol="0">
+            <a:spAutoFit/>
+          </a:bodyPr>
+          <a:lstStyle/>
+          <a:p>
+            <a:r>
+              <a:rPr lang="en-US" sz="1400" dirty="0" smtClean="0"/>
+              <a:t>Object - 1</a:t>
+            </a:r>
+            <a:endParaRPr lang="en-US" sz="1400" dirty="0"/>
+          </a:p>
+        </p:txBody>
+      </p:sp>
+      <p:sp>
+        <p:nvSpPr>
+          <p:cNvPr id="66" name="TextBox 65"/>
+          <p:cNvSpPr txBox="1"/>
+          <p:nvPr/>
+        </p:nvSpPr>
+        <p:spPr>
+          <a:xfrm>
+            <a:off x="7015162" y="4724735"/>
+            <a:ext cx="1114425" cy="307777"/>
+          </a:xfrm>
+          <a:prstGeom prst="rect">
+            <a:avLst/>
+          </a:prstGeom>
+          <a:noFill/>
+        </p:spPr>
+        <p:txBody>
+          <a:bodyPr wrap="square" rtlCol="0">
+            <a:spAutoFit/>
+          </a:bodyPr>
+          <a:lstStyle/>
+          <a:p>
+            <a:r>
+              <a:rPr lang="en-US" sz="1400" dirty="0" smtClean="0"/>
+              <a:t>Replica - 1</a:t>
+            </a:r>
+            <a:endParaRPr lang="en-US" sz="1400" dirty="0"/>
+          </a:p>
+        </p:txBody>
+      </p:sp>
+      <p:sp>
+        <p:nvSpPr>
+          <p:cNvPr id="67" name="TextBox 66"/>
+          <p:cNvSpPr txBox="1"/>
+          <p:nvPr/>
+        </p:nvSpPr>
+        <p:spPr>
+          <a:xfrm>
+            <a:off x="5042692" y="4112554"/>
+            <a:ext cx="1114425" cy="307777"/>
+          </a:xfrm>
+          <a:prstGeom prst="rect">
+            <a:avLst/>
+          </a:prstGeom>
+          <a:noFill/>
+        </p:spPr>
+        <p:txBody>
+          <a:bodyPr wrap="square" rtlCol="0">
+            <a:spAutoFit/>
+          </a:bodyPr>
+          <a:lstStyle/>
+          <a:p>
+            <a:r>
+              <a:rPr lang="en-US" sz="1400" dirty="0" smtClean="0"/>
+              <a:t>Replica - 2</a:t>
+            </a:r>
+            <a:endParaRPr lang="en-US" sz="1400" dirty="0"/>
+          </a:p>
+        </p:txBody>
+      </p:sp>
+      <p:sp>
+        <p:nvSpPr>
+          <p:cNvPr id="68" name="TextBox 67"/>
+          <p:cNvSpPr txBox="1"/>
+          <p:nvPr/>
+        </p:nvSpPr>
+        <p:spPr>
+          <a:xfrm>
+            <a:off x="3946802" y="5434621"/>
+            <a:ext cx="1114425" cy="307777"/>
+          </a:xfrm>
+          <a:prstGeom prst="rect">
+            <a:avLst/>
+          </a:prstGeom>
+          <a:noFill/>
+        </p:spPr>
+        <p:txBody>
+          <a:bodyPr wrap="square" rtlCol="0">
+            <a:spAutoFit/>
+          </a:bodyPr>
+          <a:lstStyle/>
+          <a:p>
+            <a:r>
+              <a:rPr lang="en-US" sz="1400" dirty="0" smtClean="0"/>
+              <a:t>Dir-1</a:t>
+            </a:r>
+            <a:endParaRPr lang="en-US" sz="1400" dirty="0"/>
+          </a:p>
+        </p:txBody>
+      </p:sp>
+      <p:sp>
+        <p:nvSpPr>
+          <p:cNvPr id="69" name="TextBox 68"/>
+          <p:cNvSpPr txBox="1"/>
+          <p:nvPr/>
+        </p:nvSpPr>
+        <p:spPr>
+          <a:xfrm>
+            <a:off x="6705599" y="6539926"/>
+            <a:ext cx="1114425" cy="307777"/>
+          </a:xfrm>
+          <a:prstGeom prst="rect">
+            <a:avLst/>
+          </a:prstGeom>
+          <a:noFill/>
+        </p:spPr>
+        <p:txBody>
+          <a:bodyPr wrap="square" rtlCol="0">
+            <a:spAutoFit/>
+          </a:bodyPr>
+          <a:lstStyle/>
+          <a:p>
+            <a:r>
+              <a:rPr lang="en-US" sz="1400" dirty="0" smtClean="0"/>
+              <a:t>Dir-2</a:t>
+            </a:r>
+            <a:endParaRPr lang="en-US" sz="1400" dirty="0"/>
+          </a:p>
+        </p:txBody>
+      </p:sp>
+      <p:sp>
+        <p:nvSpPr>
+          <p:cNvPr id="70" name="TextBox 69"/>
+          <p:cNvSpPr txBox="1"/>
+          <p:nvPr/>
+        </p:nvSpPr>
+        <p:spPr>
+          <a:xfrm rot="21268475">
+            <a:off x="2064195" y="4895596"/>
+            <a:ext cx="1114425" cy="307777"/>
+          </a:xfrm>
+          <a:prstGeom prst="rect">
+            <a:avLst/>
+          </a:prstGeom>
+          <a:noFill/>
+        </p:spPr>
+        <p:txBody>
+          <a:bodyPr wrap="square" rtlCol="0">
+            <a:spAutoFit/>
+          </a:bodyPr>
+          <a:lstStyle/>
+          <a:p>
+            <a:r>
+              <a:rPr lang="en-US" sz="1400" dirty="0" smtClean="0"/>
+              <a:t>Object-1?</a:t>
+            </a:r>
+            <a:endParaRPr lang="en-US" sz="1400" dirty="0"/>
+          </a:p>
+        </p:txBody>
+      </p:sp>
+      <p:sp>
+        <p:nvSpPr>
+          <p:cNvPr id="71" name="TextBox 70"/>
+          <p:cNvSpPr txBox="1"/>
+          <p:nvPr/>
+        </p:nvSpPr>
+        <p:spPr>
+          <a:xfrm rot="21355557">
+            <a:off x="2064196" y="5361941"/>
+            <a:ext cx="1114425" cy="307777"/>
+          </a:xfrm>
+          <a:prstGeom prst="rect">
+            <a:avLst/>
+          </a:prstGeom>
+          <a:noFill/>
+        </p:spPr>
+        <p:txBody>
+          <a:bodyPr wrap="square" rtlCol="0">
+            <a:spAutoFit/>
+          </a:bodyPr>
+          <a:lstStyle/>
+          <a:p>
+            <a:r>
+              <a:rPr lang="en-US" sz="1400" dirty="0" smtClean="0"/>
+              <a:t>Replica-1!</a:t>
+            </a:r>
+            <a:endParaRPr lang="en-US" sz="1400" dirty="0"/>
+          </a:p>
+        </p:txBody>
+      </p:sp>
+      <p:sp>
+        <p:nvSpPr>
+          <p:cNvPr id="72" name="TextBox 71"/>
+          <p:cNvSpPr txBox="1"/>
+          <p:nvPr/>
+        </p:nvSpPr>
+        <p:spPr>
+          <a:xfrm rot="298864">
+            <a:off x="3194269" y="5653827"/>
+            <a:ext cx="1114425" cy="307777"/>
+          </a:xfrm>
+          <a:prstGeom prst="rect">
+            <a:avLst/>
+          </a:prstGeom>
+          <a:noFill/>
+        </p:spPr>
+        <p:txBody>
+          <a:bodyPr wrap="square" rtlCol="0">
+            <a:spAutoFit/>
+          </a:bodyPr>
+          <a:lstStyle/>
+          <a:p>
+            <a:r>
+              <a:rPr lang="en-US" sz="1400" dirty="0" smtClean="0"/>
+              <a:t>Object-1?</a:t>
+            </a:r>
+            <a:endParaRPr lang="en-US" sz="1400" dirty="0"/>
+          </a:p>
+        </p:txBody>
+      </p:sp>
+      <p:sp>
+        <p:nvSpPr>
+          <p:cNvPr id="73" name="TextBox 72"/>
+          <p:cNvSpPr txBox="1"/>
+          <p:nvPr/>
+        </p:nvSpPr>
+        <p:spPr>
+          <a:xfrm rot="298864">
+            <a:off x="3125962" y="6148119"/>
+            <a:ext cx="1114425" cy="307777"/>
+          </a:xfrm>
+          <a:prstGeom prst="rect">
+            <a:avLst/>
+          </a:prstGeom>
+          <a:noFill/>
+        </p:spPr>
+        <p:txBody>
+          <a:bodyPr wrap="square" rtlCol="0">
+            <a:spAutoFit/>
+          </a:bodyPr>
+          <a:lstStyle/>
+          <a:p>
+            <a:r>
+              <a:rPr lang="en-US" sz="1400" dirty="0" smtClean="0"/>
+              <a:t>Replica-2!</a:t>
+            </a:r>
+            <a:endParaRPr lang="en-US" sz="1400" dirty="0"/>
+          </a:p>
+        </p:txBody>
+      </p:sp>
+      <p:sp>
+        <p:nvSpPr>
+          <p:cNvPr id="74" name="TextBox 73"/>
+          <p:cNvSpPr txBox="1"/>
+          <p:nvPr/>
+        </p:nvSpPr>
+        <p:spPr>
+          <a:xfrm>
+            <a:off x="3252763" y="4266251"/>
+            <a:ext cx="1812559" cy="307777"/>
+          </a:xfrm>
+          <a:prstGeom prst="rect">
+            <a:avLst/>
+          </a:prstGeom>
+          <a:noFill/>
+        </p:spPr>
+        <p:txBody>
+          <a:bodyPr wrap="square" rtlCol="0">
+            <a:spAutoFit/>
+          </a:bodyPr>
+          <a:lstStyle/>
+          <a:p>
+            <a:r>
+              <a:rPr lang="en-US" sz="1400" dirty="0" smtClean="0"/>
+              <a:t>Object-1 | Replica 1</a:t>
+            </a:r>
+            <a:endParaRPr lang="en-US" sz="1400" dirty="0"/>
+          </a:p>
+        </p:txBody>
+      </p:sp>
+      <p:sp>
+        <p:nvSpPr>
+          <p:cNvPr id="75" name="TextBox 74"/>
+          <p:cNvSpPr txBox="1"/>
+          <p:nvPr/>
+        </p:nvSpPr>
+        <p:spPr>
+          <a:xfrm>
+            <a:off x="6028530" y="5335767"/>
+            <a:ext cx="1812559" cy="307777"/>
+          </a:xfrm>
+          <a:prstGeom prst="rect">
+            <a:avLst/>
+          </a:prstGeom>
+          <a:noFill/>
+        </p:spPr>
+        <p:txBody>
+          <a:bodyPr wrap="square" rtlCol="0">
+            <a:spAutoFit/>
+          </a:bodyPr>
+          <a:lstStyle/>
+          <a:p>
+            <a:r>
+              <a:rPr lang="en-US" sz="1400" dirty="0" smtClean="0"/>
+              <a:t>Object-1 | Replica 1</a:t>
+            </a:r>
+            <a:endParaRPr lang="en-US" sz="1400" dirty="0"/>
+          </a:p>
+        </p:txBody>
+      </p:sp>
+      <p:sp>
+        <p:nvSpPr>
+          <p:cNvPr id="76" name="TextBox 75"/>
+          <p:cNvSpPr txBox="1"/>
+          <p:nvPr/>
+        </p:nvSpPr>
+        <p:spPr>
+          <a:xfrm>
+            <a:off x="6065120" y="5327735"/>
+            <a:ext cx="1812559" cy="307777"/>
+          </a:xfrm>
+          <a:prstGeom prst="rect">
+            <a:avLst/>
+          </a:prstGeom>
+          <a:noFill/>
+        </p:spPr>
+        <p:txBody>
+          <a:bodyPr wrap="square" rtlCol="0">
+            <a:spAutoFit/>
+          </a:bodyPr>
+          <a:lstStyle/>
+          <a:p>
+            <a:r>
+              <a:rPr lang="en-US" sz="1400" dirty="0" smtClean="0"/>
+              <a:t>Object-1 | Replica 2</a:t>
+            </a:r>
+            <a:endParaRPr lang="en-US" sz="1400" dirty="0"/>
+          </a:p>
+        </p:txBody>
+      </p:sp>
+      <p:sp>
+        <p:nvSpPr>
+          <p:cNvPr id="77" name="TextBox 76"/>
+          <p:cNvSpPr txBox="1"/>
+          <p:nvPr/>
+        </p:nvSpPr>
+        <p:spPr>
+          <a:xfrm>
+            <a:off x="734514" y="4613916"/>
+            <a:ext cx="1114425" cy="307777"/>
+          </a:xfrm>
+          <a:prstGeom prst="rect">
+            <a:avLst/>
+          </a:prstGeom>
+          <a:noFill/>
+        </p:spPr>
+        <p:txBody>
+          <a:bodyPr wrap="square" rtlCol="0">
+            <a:spAutoFit/>
+          </a:bodyPr>
+          <a:lstStyle/>
+          <a:p>
+            <a:r>
+              <a:rPr lang="en-US" sz="1400" dirty="0" smtClean="0"/>
+              <a:t>Client</a:t>
+            </a:r>
+            <a:endParaRPr lang="en-US" sz="1400" dirty="0"/>
+          </a:p>
+        </p:txBody>
+      </p:sp>
     </p:spTree>
     <p:extLst>
       <p:ext uri="{BB962C8B-B14F-4D97-AF65-F5344CB8AC3E}">
@@ -7260,6 +8348,701 @@
   <p:clrMapOvr>
     <a:masterClrMapping/>
   </p:clrMapOvr>
+  <p:timing>
+    <p:tnLst>
+      <p:par>
+        <p:cTn id="1" dur="indefinite" restart="never" nodeType="tmRoot">
+          <p:childTnLst>
+            <p:seq concurrent="1" nextAc="seek">
+              <p:cTn id="2" dur="indefinite" nodeType="mainSeq">
+                <p:childTnLst>
+                  <p:par>
+                    <p:cTn id="3" fill="hold">
+                      <p:stCondLst>
+                        <p:cond delay="indefinite"/>
+                      </p:stCondLst>
+                      <p:childTnLst>
+                        <p:par>
+                          <p:cTn id="4" fill="hold">
+                            <p:stCondLst>
+                              <p:cond delay="0"/>
+                            </p:stCondLst>
+                            <p:childTnLst>
+                              <p:par>
+                                <p:cTn id="5" presetID="1" presetClass="entr" presetSubtype="0" fill="hold" nodeType="clickEffect">
+                                  <p:stCondLst>
+                                    <p:cond delay="0"/>
+                                  </p:stCondLst>
+                                  <p:childTnLst>
+                                    <p:set>
+                                      <p:cBhvr>
+                                        <p:cTn id="6" dur="1" fill="hold">
+                                          <p:stCondLst>
+                                            <p:cond delay="0"/>
+                                          </p:stCondLst>
+                                        </p:cTn>
+                                        <p:tgtEl>
+                                          <p:spTgt spid="6"/>
+                                        </p:tgtEl>
+                                        <p:attrNameLst>
+                                          <p:attrName>style.visibility</p:attrName>
+                                        </p:attrNameLst>
+                                      </p:cBhvr>
+                                      <p:to>
+                                        <p:strVal val="visible"/>
+                                      </p:to>
+                                    </p:set>
+                                  </p:childTnLst>
+                                </p:cTn>
+                              </p:par>
+                            </p:childTnLst>
+                          </p:cTn>
+                        </p:par>
+                      </p:childTnLst>
+                    </p:cTn>
+                  </p:par>
+                  <p:par>
+                    <p:cTn id="7" fill="hold">
+                      <p:stCondLst>
+                        <p:cond delay="indefinite"/>
+                      </p:stCondLst>
+                      <p:childTnLst>
+                        <p:par>
+                          <p:cTn id="8" fill="hold">
+                            <p:stCondLst>
+                              <p:cond delay="0"/>
+                            </p:stCondLst>
+                            <p:childTnLst>
+                              <p:par>
+                                <p:cTn id="9" presetID="1" presetClass="entr" presetSubtype="0" fill="hold" nodeType="clickEffect">
+                                  <p:stCondLst>
+                                    <p:cond delay="0"/>
+                                  </p:stCondLst>
+                                  <p:childTnLst>
+                                    <p:set>
+                                      <p:cBhvr>
+                                        <p:cTn id="10" dur="1" fill="hold">
+                                          <p:stCondLst>
+                                            <p:cond delay="0"/>
+                                          </p:stCondLst>
+                                        </p:cTn>
+                                        <p:tgtEl>
+                                          <p:spTgt spid="16"/>
+                                        </p:tgtEl>
+                                        <p:attrNameLst>
+                                          <p:attrName>style.visibility</p:attrName>
+                                        </p:attrNameLst>
+                                      </p:cBhvr>
+                                      <p:to>
+                                        <p:strVal val="visible"/>
+                                      </p:to>
+                                    </p:set>
+                                  </p:childTnLst>
+                                </p:cTn>
+                              </p:par>
+                            </p:childTnLst>
+                          </p:cTn>
+                        </p:par>
+                      </p:childTnLst>
+                    </p:cTn>
+                  </p:par>
+                  <p:par>
+                    <p:cTn id="11" fill="hold">
+                      <p:stCondLst>
+                        <p:cond delay="indefinite"/>
+                      </p:stCondLst>
+                      <p:childTnLst>
+                        <p:par>
+                          <p:cTn id="12" fill="hold">
+                            <p:stCondLst>
+                              <p:cond delay="0"/>
+                            </p:stCondLst>
+                            <p:childTnLst>
+                              <p:par>
+                                <p:cTn id="13" presetID="1" presetClass="exit" presetSubtype="0" fill="hold" grpId="0" nodeType="clickEffect">
+                                  <p:stCondLst>
+                                    <p:cond delay="0"/>
+                                  </p:stCondLst>
+                                  <p:childTnLst>
+                                    <p:set>
+                                      <p:cBhvr>
+                                        <p:cTn id="14" dur="1" fill="hold">
+                                          <p:stCondLst>
+                                            <p:cond delay="0"/>
+                                          </p:stCondLst>
+                                        </p:cTn>
+                                        <p:tgtEl>
+                                          <p:spTgt spid="75"/>
+                                        </p:tgtEl>
+                                        <p:attrNameLst>
+                                          <p:attrName>style.visibility</p:attrName>
+                                        </p:attrNameLst>
+                                      </p:cBhvr>
+                                      <p:to>
+                                        <p:strVal val="hidden"/>
+                                      </p:to>
+                                    </p:set>
+                                  </p:childTnLst>
+                                </p:cTn>
+                              </p:par>
+                            </p:childTnLst>
+                          </p:cTn>
+                        </p:par>
+                      </p:childTnLst>
+                    </p:cTn>
+                  </p:par>
+                  <p:par>
+                    <p:cTn id="15" fill="hold">
+                      <p:stCondLst>
+                        <p:cond delay="indefinite"/>
+                      </p:stCondLst>
+                      <p:childTnLst>
+                        <p:par>
+                          <p:cTn id="16" fill="hold">
+                            <p:stCondLst>
+                              <p:cond delay="0"/>
+                            </p:stCondLst>
+                            <p:childTnLst>
+                              <p:par>
+                                <p:cTn id="17" presetID="1" presetClass="entr" presetSubtype="0" fill="hold" grpId="0" nodeType="clickEffect">
+                                  <p:stCondLst>
+                                    <p:cond delay="0"/>
+                                  </p:stCondLst>
+                                  <p:childTnLst>
+                                    <p:set>
+                                      <p:cBhvr>
+                                        <p:cTn id="18" dur="1" fill="hold">
+                                          <p:stCondLst>
+                                            <p:cond delay="0"/>
+                                          </p:stCondLst>
+                                        </p:cTn>
+                                        <p:tgtEl>
+                                          <p:spTgt spid="76"/>
+                                        </p:tgtEl>
+                                        <p:attrNameLst>
+                                          <p:attrName>style.visibility</p:attrName>
+                                        </p:attrNameLst>
+                                      </p:cBhvr>
+                                      <p:to>
+                                        <p:strVal val="visible"/>
+                                      </p:to>
+                                    </p:set>
+                                  </p:childTnLst>
+                                </p:cTn>
+                              </p:par>
+                            </p:childTnLst>
+                          </p:cTn>
+                        </p:par>
+                      </p:childTnLst>
+                    </p:cTn>
+                  </p:par>
+                  <p:par>
+                    <p:cTn id="19" fill="hold">
+                      <p:stCondLst>
+                        <p:cond delay="indefinite"/>
+                      </p:stCondLst>
+                      <p:childTnLst>
+                        <p:par>
+                          <p:cTn id="20" fill="hold">
+                            <p:stCondLst>
+                              <p:cond delay="0"/>
+                            </p:stCondLst>
+                            <p:childTnLst>
+                              <p:par>
+                                <p:cTn id="21" presetID="1" presetClass="entr" presetSubtype="0" fill="hold" nodeType="clickEffect">
+                                  <p:stCondLst>
+                                    <p:cond delay="0"/>
+                                  </p:stCondLst>
+                                  <p:childTnLst>
+                                    <p:set>
+                                      <p:cBhvr>
+                                        <p:cTn id="22" dur="1" fill="hold">
+                                          <p:stCondLst>
+                                            <p:cond delay="0"/>
+                                          </p:stCondLst>
+                                        </p:cTn>
+                                        <p:tgtEl>
+                                          <p:spTgt spid="19"/>
+                                        </p:tgtEl>
+                                        <p:attrNameLst>
+                                          <p:attrName>style.visibility</p:attrName>
+                                        </p:attrNameLst>
+                                      </p:cBhvr>
+                                      <p:to>
+                                        <p:strVal val="visible"/>
+                                      </p:to>
+                                    </p:set>
+                                  </p:childTnLst>
+                                </p:cTn>
+                              </p:par>
+                              <p:par>
+                                <p:cTn id="23" presetID="1" presetClass="entr" presetSubtype="0" fill="hold" nodeType="withEffect">
+                                  <p:stCondLst>
+                                    <p:cond delay="0"/>
+                                  </p:stCondLst>
+                                  <p:childTnLst>
+                                    <p:set>
+                                      <p:cBhvr>
+                                        <p:cTn id="24" dur="1" fill="hold">
+                                          <p:stCondLst>
+                                            <p:cond delay="0"/>
+                                          </p:stCondLst>
+                                        </p:cTn>
+                                        <p:tgtEl>
+                                          <p:spTgt spid="1031"/>
+                                        </p:tgtEl>
+                                        <p:attrNameLst>
+                                          <p:attrName>style.visibility</p:attrName>
+                                        </p:attrNameLst>
+                                      </p:cBhvr>
+                                      <p:to>
+                                        <p:strVal val="visible"/>
+                                      </p:to>
+                                    </p:set>
+                                  </p:childTnLst>
+                                </p:cTn>
+                              </p:par>
+                            </p:childTnLst>
+                          </p:cTn>
+                        </p:par>
+                      </p:childTnLst>
+                    </p:cTn>
+                  </p:par>
+                  <p:par>
+                    <p:cTn id="25" fill="hold">
+                      <p:stCondLst>
+                        <p:cond delay="indefinite"/>
+                      </p:stCondLst>
+                      <p:childTnLst>
+                        <p:par>
+                          <p:cTn id="26" fill="hold">
+                            <p:stCondLst>
+                              <p:cond delay="0"/>
+                            </p:stCondLst>
+                            <p:childTnLst>
+                              <p:par>
+                                <p:cTn id="27" presetID="1" presetClass="entr" presetSubtype="0" fill="hold" nodeType="clickEffect">
+                                  <p:stCondLst>
+                                    <p:cond delay="0"/>
+                                  </p:stCondLst>
+                                  <p:childTnLst>
+                                    <p:set>
+                                      <p:cBhvr>
+                                        <p:cTn id="28" dur="1" fill="hold">
+                                          <p:stCondLst>
+                                            <p:cond delay="0"/>
+                                          </p:stCondLst>
+                                        </p:cTn>
+                                        <p:tgtEl>
+                                          <p:spTgt spid="64"/>
+                                        </p:tgtEl>
+                                        <p:attrNameLst>
+                                          <p:attrName>style.visibility</p:attrName>
+                                        </p:attrNameLst>
+                                      </p:cBhvr>
+                                      <p:to>
+                                        <p:strVal val="visible"/>
+                                      </p:to>
+                                    </p:set>
+                                  </p:childTnLst>
+                                </p:cTn>
+                              </p:par>
+                              <p:par>
+                                <p:cTn id="29" presetID="1" presetClass="entr" presetSubtype="0" fill="hold" nodeType="withEffect">
+                                  <p:stCondLst>
+                                    <p:cond delay="0"/>
+                                  </p:stCondLst>
+                                  <p:childTnLst>
+                                    <p:set>
+                                      <p:cBhvr>
+                                        <p:cTn id="30" dur="1" fill="hold">
+                                          <p:stCondLst>
+                                            <p:cond delay="0"/>
+                                          </p:stCondLst>
+                                        </p:cTn>
+                                        <p:tgtEl>
+                                          <p:spTgt spid="20"/>
+                                        </p:tgtEl>
+                                        <p:attrNameLst>
+                                          <p:attrName>style.visibility</p:attrName>
+                                        </p:attrNameLst>
+                                      </p:cBhvr>
+                                      <p:to>
+                                        <p:strVal val="visible"/>
+                                      </p:to>
+                                    </p:set>
+                                  </p:childTnLst>
+                                </p:cTn>
+                              </p:par>
+                            </p:childTnLst>
+                          </p:cTn>
+                        </p:par>
+                      </p:childTnLst>
+                    </p:cTn>
+                  </p:par>
+                  <p:par>
+                    <p:cTn id="31" fill="hold">
+                      <p:stCondLst>
+                        <p:cond delay="indefinite"/>
+                      </p:stCondLst>
+                      <p:childTnLst>
+                        <p:par>
+                          <p:cTn id="32" fill="hold">
+                            <p:stCondLst>
+                              <p:cond delay="0"/>
+                            </p:stCondLst>
+                            <p:childTnLst>
+                              <p:par>
+                                <p:cTn id="33" presetID="26" presetClass="emph" presetSubtype="0" fill="hold" grpId="0" nodeType="clickEffect">
+                                  <p:stCondLst>
+                                    <p:cond delay="0"/>
+                                  </p:stCondLst>
+                                  <p:childTnLst>
+                                    <p:animEffect transition="out" filter="fade">
+                                      <p:cBhvr>
+                                        <p:cTn id="34" dur="500" tmFilter="0, 0; .2, .5; .8, .5; 1, 0"/>
+                                        <p:tgtEl>
+                                          <p:spTgt spid="74"/>
+                                        </p:tgtEl>
+                                      </p:cBhvr>
+                                    </p:animEffect>
+                                    <p:animScale>
+                                      <p:cBhvr>
+                                        <p:cTn id="35" dur="250" autoRev="1" fill="hold"/>
+                                        <p:tgtEl>
+                                          <p:spTgt spid="74"/>
+                                        </p:tgtEl>
+                                      </p:cBhvr>
+                                      <p:by x="105000" y="105000"/>
+                                    </p:animScale>
+                                  </p:childTnLst>
+                                </p:cTn>
+                              </p:par>
+                            </p:childTnLst>
+                          </p:cTn>
+                        </p:par>
+                      </p:childTnLst>
+                    </p:cTn>
+                  </p:par>
+                  <p:par>
+                    <p:cTn id="36" fill="hold">
+                      <p:stCondLst>
+                        <p:cond delay="indefinite"/>
+                      </p:stCondLst>
+                      <p:childTnLst>
+                        <p:par>
+                          <p:cTn id="37" fill="hold">
+                            <p:stCondLst>
+                              <p:cond delay="0"/>
+                            </p:stCondLst>
+                            <p:childTnLst>
+                              <p:par>
+                                <p:cTn id="38" presetID="1" presetClass="entr" presetSubtype="0" fill="hold" grpId="0" nodeType="clickEffect">
+                                  <p:stCondLst>
+                                    <p:cond delay="0"/>
+                                  </p:stCondLst>
+                                  <p:childTnLst>
+                                    <p:set>
+                                      <p:cBhvr>
+                                        <p:cTn id="39" dur="1" fill="hold">
+                                          <p:stCondLst>
+                                            <p:cond delay="0"/>
+                                          </p:stCondLst>
+                                        </p:cTn>
+                                        <p:tgtEl>
+                                          <p:spTgt spid="70"/>
+                                        </p:tgtEl>
+                                        <p:attrNameLst>
+                                          <p:attrName>style.visibility</p:attrName>
+                                        </p:attrNameLst>
+                                      </p:cBhvr>
+                                      <p:to>
+                                        <p:strVal val="visible"/>
+                                      </p:to>
+                                    </p:set>
+                                  </p:childTnLst>
+                                </p:cTn>
+                              </p:par>
+                              <p:par>
+                                <p:cTn id="40" presetID="1" presetClass="entr" presetSubtype="0" fill="hold" nodeType="withEffect">
+                                  <p:stCondLst>
+                                    <p:cond delay="0"/>
+                                  </p:stCondLst>
+                                  <p:childTnLst>
+                                    <p:set>
+                                      <p:cBhvr>
+                                        <p:cTn id="41" dur="1" fill="hold">
+                                          <p:stCondLst>
+                                            <p:cond delay="0"/>
+                                          </p:stCondLst>
+                                        </p:cTn>
+                                        <p:tgtEl>
+                                          <p:spTgt spid="29"/>
+                                        </p:tgtEl>
+                                        <p:attrNameLst>
+                                          <p:attrName>style.visibility</p:attrName>
+                                        </p:attrNameLst>
+                                      </p:cBhvr>
+                                      <p:to>
+                                        <p:strVal val="visible"/>
+                                      </p:to>
+                                    </p:set>
+                                  </p:childTnLst>
+                                </p:cTn>
+                              </p:par>
+                            </p:childTnLst>
+                          </p:cTn>
+                        </p:par>
+                      </p:childTnLst>
+                    </p:cTn>
+                  </p:par>
+                  <p:par>
+                    <p:cTn id="42" fill="hold">
+                      <p:stCondLst>
+                        <p:cond delay="indefinite"/>
+                      </p:stCondLst>
+                      <p:childTnLst>
+                        <p:par>
+                          <p:cTn id="43" fill="hold">
+                            <p:stCondLst>
+                              <p:cond delay="0"/>
+                            </p:stCondLst>
+                            <p:childTnLst>
+                              <p:par>
+                                <p:cTn id="44" presetID="1" presetClass="entr" presetSubtype="0" fill="hold" nodeType="clickEffect">
+                                  <p:stCondLst>
+                                    <p:cond delay="0"/>
+                                  </p:stCondLst>
+                                  <p:childTnLst>
+                                    <p:set>
+                                      <p:cBhvr>
+                                        <p:cTn id="45" dur="1" fill="hold">
+                                          <p:stCondLst>
+                                            <p:cond delay="0"/>
+                                          </p:stCondLst>
+                                        </p:cTn>
+                                        <p:tgtEl>
+                                          <p:spTgt spid="34"/>
+                                        </p:tgtEl>
+                                        <p:attrNameLst>
+                                          <p:attrName>style.visibility</p:attrName>
+                                        </p:attrNameLst>
+                                      </p:cBhvr>
+                                      <p:to>
+                                        <p:strVal val="visible"/>
+                                      </p:to>
+                                    </p:set>
+                                  </p:childTnLst>
+                                </p:cTn>
+                              </p:par>
+                              <p:par>
+                                <p:cTn id="46" presetID="1" presetClass="entr" presetSubtype="0" fill="hold" grpId="0" nodeType="withEffect">
+                                  <p:stCondLst>
+                                    <p:cond delay="0"/>
+                                  </p:stCondLst>
+                                  <p:childTnLst>
+                                    <p:set>
+                                      <p:cBhvr>
+                                        <p:cTn id="47" dur="1" fill="hold">
+                                          <p:stCondLst>
+                                            <p:cond delay="0"/>
+                                          </p:stCondLst>
+                                        </p:cTn>
+                                        <p:tgtEl>
+                                          <p:spTgt spid="71"/>
+                                        </p:tgtEl>
+                                        <p:attrNameLst>
+                                          <p:attrName>style.visibility</p:attrName>
+                                        </p:attrNameLst>
+                                      </p:cBhvr>
+                                      <p:to>
+                                        <p:strVal val="visible"/>
+                                      </p:to>
+                                    </p:set>
+                                  </p:childTnLst>
+                                </p:cTn>
+                              </p:par>
+                            </p:childTnLst>
+                          </p:cTn>
+                        </p:par>
+                      </p:childTnLst>
+                    </p:cTn>
+                  </p:par>
+                  <p:par>
+                    <p:cTn id="48" fill="hold">
+                      <p:stCondLst>
+                        <p:cond delay="indefinite"/>
+                      </p:stCondLst>
+                      <p:childTnLst>
+                        <p:par>
+                          <p:cTn id="49" fill="hold">
+                            <p:stCondLst>
+                              <p:cond delay="0"/>
+                            </p:stCondLst>
+                            <p:childTnLst>
+                              <p:par>
+                                <p:cTn id="50" presetID="1" presetClass="entr" presetSubtype="0" fill="hold" grpId="0" nodeType="clickEffect">
+                                  <p:stCondLst>
+                                    <p:cond delay="0"/>
+                                  </p:stCondLst>
+                                  <p:childTnLst>
+                                    <p:set>
+                                      <p:cBhvr>
+                                        <p:cTn id="51" dur="1" fill="hold">
+                                          <p:stCondLst>
+                                            <p:cond delay="0"/>
+                                          </p:stCondLst>
+                                        </p:cTn>
+                                        <p:tgtEl>
+                                          <p:spTgt spid="72"/>
+                                        </p:tgtEl>
+                                        <p:attrNameLst>
+                                          <p:attrName>style.visibility</p:attrName>
+                                        </p:attrNameLst>
+                                      </p:cBhvr>
+                                      <p:to>
+                                        <p:strVal val="visible"/>
+                                      </p:to>
+                                    </p:set>
+                                  </p:childTnLst>
+                                </p:cTn>
+                              </p:par>
+                              <p:par>
+                                <p:cTn id="52" presetID="1" presetClass="entr" presetSubtype="0" fill="hold" nodeType="withEffect">
+                                  <p:stCondLst>
+                                    <p:cond delay="0"/>
+                                  </p:stCondLst>
+                                  <p:childTnLst>
+                                    <p:set>
+                                      <p:cBhvr>
+                                        <p:cTn id="53" dur="1" fill="hold">
+                                          <p:stCondLst>
+                                            <p:cond delay="0"/>
+                                          </p:stCondLst>
+                                        </p:cTn>
+                                        <p:tgtEl>
+                                          <p:spTgt spid="40"/>
+                                        </p:tgtEl>
+                                        <p:attrNameLst>
+                                          <p:attrName>style.visibility</p:attrName>
+                                        </p:attrNameLst>
+                                      </p:cBhvr>
+                                      <p:to>
+                                        <p:strVal val="visible"/>
+                                      </p:to>
+                                    </p:set>
+                                  </p:childTnLst>
+                                </p:cTn>
+                              </p:par>
+                            </p:childTnLst>
+                          </p:cTn>
+                        </p:par>
+                      </p:childTnLst>
+                    </p:cTn>
+                  </p:par>
+                  <p:par>
+                    <p:cTn id="54" fill="hold">
+                      <p:stCondLst>
+                        <p:cond delay="indefinite"/>
+                      </p:stCondLst>
+                      <p:childTnLst>
+                        <p:par>
+                          <p:cTn id="55" fill="hold">
+                            <p:stCondLst>
+                              <p:cond delay="0"/>
+                            </p:stCondLst>
+                            <p:childTnLst>
+                              <p:par>
+                                <p:cTn id="56" presetID="1" presetClass="entr" presetSubtype="0" fill="hold" grpId="0" nodeType="clickEffect">
+                                  <p:stCondLst>
+                                    <p:cond delay="0"/>
+                                  </p:stCondLst>
+                                  <p:childTnLst>
+                                    <p:set>
+                                      <p:cBhvr>
+                                        <p:cTn id="57" dur="1" fill="hold">
+                                          <p:stCondLst>
+                                            <p:cond delay="0"/>
+                                          </p:stCondLst>
+                                        </p:cTn>
+                                        <p:tgtEl>
+                                          <p:spTgt spid="73"/>
+                                        </p:tgtEl>
+                                        <p:attrNameLst>
+                                          <p:attrName>style.visibility</p:attrName>
+                                        </p:attrNameLst>
+                                      </p:cBhvr>
+                                      <p:to>
+                                        <p:strVal val="visible"/>
+                                      </p:to>
+                                    </p:set>
+                                  </p:childTnLst>
+                                </p:cTn>
+                              </p:par>
+                              <p:par>
+                                <p:cTn id="58" presetID="1" presetClass="entr" presetSubtype="0" fill="hold" nodeType="withEffect">
+                                  <p:stCondLst>
+                                    <p:cond delay="0"/>
+                                  </p:stCondLst>
+                                  <p:childTnLst>
+                                    <p:set>
+                                      <p:cBhvr>
+                                        <p:cTn id="59" dur="1" fill="hold">
+                                          <p:stCondLst>
+                                            <p:cond delay="0"/>
+                                          </p:stCondLst>
+                                        </p:cTn>
+                                        <p:tgtEl>
+                                          <p:spTgt spid="41"/>
+                                        </p:tgtEl>
+                                        <p:attrNameLst>
+                                          <p:attrName>style.visibility</p:attrName>
+                                        </p:attrNameLst>
+                                      </p:cBhvr>
+                                      <p:to>
+                                        <p:strVal val="visible"/>
+                                      </p:to>
+                                    </p:set>
+                                  </p:childTnLst>
+                                </p:cTn>
+                              </p:par>
+                            </p:childTnLst>
+                          </p:cTn>
+                        </p:par>
+                      </p:childTnLst>
+                    </p:cTn>
+                  </p:par>
+                </p:childTnLst>
+              </p:cTn>
+              <p:prevCondLst>
+                <p:cond evt="onPrev" delay="0">
+                  <p:tgtEl>
+                    <p:sldTgt/>
+                  </p:tgtEl>
+                </p:cond>
+              </p:prevCondLst>
+              <p:nextCondLst>
+                <p:cond evt="onNext" delay="0">
+                  <p:tgtEl>
+                    <p:sldTgt/>
+                  </p:tgtEl>
+                </p:cond>
+              </p:nextCondLst>
+            </p:seq>
+          </p:childTnLst>
+        </p:cTn>
+      </p:par>
+    </p:tnLst>
+    <p:bldLst>
+      <p:bldP spid="70" grpId="0"/>
+      <p:bldP spid="71" grpId="0"/>
+      <p:bldP spid="72" grpId="0"/>
+      <p:bldP spid="73" grpId="0"/>
+      <p:bldP spid="74" grpId="0"/>
+      <p:bldP spid="75" grpId="0"/>
+      <p:bldP spid="76" grpId="0"/>
+    </p:bldLst>
+  </p:timing>
 </p:sld>
 </file>
 
@@ -7357,6 +9140,13 @@
   <p:clrMapOvr>
     <a:masterClrMapping/>
   </p:clrMapOvr>
+  <p:timing>
+    <p:tnLst>
+      <p:par>
+        <p:cTn id="1" dur="indefinite" restart="never" nodeType="tmRoot"/>
+      </p:par>
+    </p:tnLst>
+  </p:timing>
 </p:sld>
 </file>
 
@@ -7479,6 +9269,13 @@
   <p:clrMapOvr>
     <a:masterClrMapping/>
   </p:clrMapOvr>
+  <p:timing>
+    <p:tnLst>
+      <p:par>
+        <p:cTn id="1" dur="indefinite" restart="never" nodeType="tmRoot"/>
+      </p:par>
+    </p:tnLst>
+  </p:timing>
 </p:sld>
 </file>
 
@@ -7588,6 +9385,13 @@
   <p:clrMapOvr>
     <a:masterClrMapping/>
   </p:clrMapOvr>
+  <p:timing>
+    <p:tnLst>
+      <p:par>
+        <p:cTn id="1" dur="indefinite" restart="never" nodeType="tmRoot"/>
+      </p:par>
+    </p:tnLst>
+  </p:timing>
 </p:sld>
 </file>
 

</xml_diff>